<commit_message>
KM booklet created on MongoDB
</commit_message>
<xml_diff>
--- a/KM_MongoDB.pptx
+++ b/KM_MongoDB.pptx
@@ -6,10 +6,10 @@
     <p:sldMasterId id="2147483877" r:id="rId5"/>
   </p:sldMasterIdLst>
   <p:notesMasterIdLst>
-    <p:notesMasterId r:id="rId33"/>
+    <p:notesMasterId r:id="rId34"/>
   </p:notesMasterIdLst>
   <p:handoutMasterIdLst>
-    <p:handoutMasterId r:id="rId34"/>
+    <p:handoutMasterId r:id="rId35"/>
   </p:handoutMasterIdLst>
   <p:sldIdLst>
     <p:sldId id="498" r:id="rId6"/>
@@ -37,8 +37,9 @@
     <p:sldId id="610" r:id="rId28"/>
     <p:sldId id="612" r:id="rId29"/>
     <p:sldId id="611" r:id="rId30"/>
-    <p:sldId id="578" r:id="rId31"/>
-    <p:sldId id="564" r:id="rId32"/>
+    <p:sldId id="613" r:id="rId31"/>
+    <p:sldId id="578" r:id="rId32"/>
+    <p:sldId id="564" r:id="rId33"/>
   </p:sldIdLst>
   <p:sldSz cx="9144000" cy="6858000" type="screen4x3"/>
   <p:notesSz cx="7016750" cy="9309100"/>
@@ -169,7 +170,7 @@
   </p:defaultTextStyle>
   <p:extLst>
     <p:ext uri="{EFAFB233-063F-42B5-8137-9DF3F51BA10A}">
-      <p15:sldGuideLst xmlns="" xmlns:p15="http://schemas.microsoft.com/office/powerpoint/2012/main">
+      <p15:sldGuideLst xmlns:p15="http://schemas.microsoft.com/office/powerpoint/2012/main" xmlns="">
         <p15:guide id="1" orient="horz" pos="1172">
           <p15:clr>
             <a:srgbClr val="A4A3A4"/>
@@ -203,7 +204,7 @@
       </p15:sldGuideLst>
     </p:ext>
     <p:ext uri="{2D200454-40CA-4A62-9FC3-DE9A4176ACB9}">
-      <p15:notesGuideLst xmlns="" xmlns:p15="http://schemas.microsoft.com/office/powerpoint/2012/main">
+      <p15:notesGuideLst xmlns:p15="http://schemas.microsoft.com/office/powerpoint/2012/main" xmlns="">
         <p15:guide id="1" orient="horz" pos="2932">
           <p15:clr>
             <a:srgbClr val="A4A3A4"/>
@@ -4109,7 +4110,7 @@
               <a:pPr>
                 <a:defRPr/>
               </a:pPr>
-              <a:t>1/15/2023</a:t>
+              <a:t>1/16/2023</a:t>
             </a:fld>
             <a:endParaRPr lang="en-US" dirty="0"/>
           </a:p>
@@ -7267,21 +7268,21 @@
                 <a:gridCol w="1452208">
                   <a:extLst>
                     <a:ext uri="{9D8B030D-6E8A-4147-A177-3AD203B41FA5}">
-                      <a16:colId xmlns="" xmlns:a16="http://schemas.microsoft.com/office/drawing/2014/main" val="20000"/>
+                      <a16:colId xmlns:a16="http://schemas.microsoft.com/office/drawing/2014/main" xmlns="" val="20000"/>
                     </a:ext>
                   </a:extLst>
                 </a:gridCol>
                 <a:gridCol w="3664128">
                   <a:extLst>
                     <a:ext uri="{9D8B030D-6E8A-4147-A177-3AD203B41FA5}">
-                      <a16:colId xmlns="" xmlns:a16="http://schemas.microsoft.com/office/drawing/2014/main" val="20001"/>
+                      <a16:colId xmlns:a16="http://schemas.microsoft.com/office/drawing/2014/main" xmlns="" val="20001"/>
                     </a:ext>
                   </a:extLst>
                 </a:gridCol>
                 <a:gridCol w="3664128">
                   <a:extLst>
                     <a:ext uri="{9D8B030D-6E8A-4147-A177-3AD203B41FA5}">
-                      <a16:colId xmlns="" xmlns:a16="http://schemas.microsoft.com/office/drawing/2014/main" val="20002"/>
+                      <a16:colId xmlns:a16="http://schemas.microsoft.com/office/drawing/2014/main" xmlns="" val="20002"/>
                     </a:ext>
                   </a:extLst>
                 </a:gridCol>
@@ -7365,7 +7366,7 @@
                 </a:tc>
                 <a:extLst>
                   <a:ext uri="{0D108BD9-81ED-4DB2-BD59-A6C34878D82A}">
-                    <a16:rowId xmlns="" xmlns:a16="http://schemas.microsoft.com/office/drawing/2014/main" val="10000"/>
+                    <a16:rowId xmlns:a16="http://schemas.microsoft.com/office/drawing/2014/main" xmlns="" val="10000"/>
                   </a:ext>
                 </a:extLst>
               </a:tr>
@@ -7477,7 +7478,7 @@
                 </a:tc>
                 <a:extLst>
                   <a:ext uri="{0D108BD9-81ED-4DB2-BD59-A6C34878D82A}">
-                    <a16:rowId xmlns="" xmlns:a16="http://schemas.microsoft.com/office/drawing/2014/main" val="10001"/>
+                    <a16:rowId xmlns:a16="http://schemas.microsoft.com/office/drawing/2014/main" xmlns="" val="10001"/>
                   </a:ext>
                 </a:extLst>
               </a:tr>
@@ -7737,7 +7738,7 @@
                 </a:tc>
                 <a:extLst>
                   <a:ext uri="{0D108BD9-81ED-4DB2-BD59-A6C34878D82A}">
-                    <a16:rowId xmlns="" xmlns:a16="http://schemas.microsoft.com/office/drawing/2014/main" val="10002"/>
+                    <a16:rowId xmlns:a16="http://schemas.microsoft.com/office/drawing/2014/main" xmlns="" val="10002"/>
                   </a:ext>
                 </a:extLst>
               </a:tr>
@@ -7840,7 +7841,7 @@
                 </a:tc>
                 <a:extLst>
                   <a:ext uri="{0D108BD9-81ED-4DB2-BD59-A6C34878D82A}">
-                    <a16:rowId xmlns="" xmlns:a16="http://schemas.microsoft.com/office/drawing/2014/main" val="10003"/>
+                    <a16:rowId xmlns:a16="http://schemas.microsoft.com/office/drawing/2014/main" xmlns="" val="10003"/>
                   </a:ext>
                 </a:extLst>
               </a:tr>
@@ -7929,7 +7930,7 @@
                 </a:tc>
                 <a:extLst>
                   <a:ext uri="{0D108BD9-81ED-4DB2-BD59-A6C34878D82A}">
-                    <a16:rowId xmlns="" xmlns:a16="http://schemas.microsoft.com/office/drawing/2014/main" val="10004"/>
+                    <a16:rowId xmlns:a16="http://schemas.microsoft.com/office/drawing/2014/main" xmlns="" val="10004"/>
                   </a:ext>
                 </a:extLst>
               </a:tr>
@@ -8365,7 +8366,7 @@
                 </a:tc>
                 <a:extLst>
                   <a:ext uri="{0D108BD9-81ED-4DB2-BD59-A6C34878D82A}">
-                    <a16:rowId xmlns="" xmlns:a16="http://schemas.microsoft.com/office/drawing/2014/main" val="10005"/>
+                    <a16:rowId xmlns:a16="http://schemas.microsoft.com/office/drawing/2014/main" xmlns="" val="10005"/>
                   </a:ext>
                 </a:extLst>
               </a:tr>
@@ -9256,21 +9257,21 @@
                 <a:gridCol w="1452285">
                   <a:extLst>
                     <a:ext uri="{9D8B030D-6E8A-4147-A177-3AD203B41FA5}">
-                      <a16:colId xmlns="" xmlns:a16="http://schemas.microsoft.com/office/drawing/2014/main" val="20000"/>
+                      <a16:colId xmlns:a16="http://schemas.microsoft.com/office/drawing/2014/main" xmlns="" val="20000"/>
                     </a:ext>
                   </a:extLst>
                 </a:gridCol>
                 <a:gridCol w="3664323">
                   <a:extLst>
                     <a:ext uri="{9D8B030D-6E8A-4147-A177-3AD203B41FA5}">
-                      <a16:colId xmlns="" xmlns:a16="http://schemas.microsoft.com/office/drawing/2014/main" val="20001"/>
+                      <a16:colId xmlns:a16="http://schemas.microsoft.com/office/drawing/2014/main" xmlns="" val="20001"/>
                     </a:ext>
                   </a:extLst>
                 </a:gridCol>
                 <a:gridCol w="3664323">
                   <a:extLst>
                     <a:ext uri="{9D8B030D-6E8A-4147-A177-3AD203B41FA5}">
-                      <a16:colId xmlns="" xmlns:a16="http://schemas.microsoft.com/office/drawing/2014/main" val="20002"/>
+                      <a16:colId xmlns:a16="http://schemas.microsoft.com/office/drawing/2014/main" xmlns="" val="20002"/>
                     </a:ext>
                   </a:extLst>
                 </a:gridCol>
@@ -9354,7 +9355,7 @@
                 </a:tc>
                 <a:extLst>
                   <a:ext uri="{0D108BD9-81ED-4DB2-BD59-A6C34878D82A}">
-                    <a16:rowId xmlns="" xmlns:a16="http://schemas.microsoft.com/office/drawing/2014/main" val="10000"/>
+                    <a16:rowId xmlns:a16="http://schemas.microsoft.com/office/drawing/2014/main" xmlns="" val="10000"/>
                   </a:ext>
                 </a:extLst>
               </a:tr>
@@ -9487,7 +9488,7 @@
                 </a:tc>
                 <a:extLst>
                   <a:ext uri="{0D108BD9-81ED-4DB2-BD59-A6C34878D82A}">
-                    <a16:rowId xmlns="" xmlns:a16="http://schemas.microsoft.com/office/drawing/2014/main" val="10001"/>
+                    <a16:rowId xmlns:a16="http://schemas.microsoft.com/office/drawing/2014/main" xmlns="" val="10001"/>
                   </a:ext>
                 </a:extLst>
               </a:tr>
@@ -9739,7 +9740,7 @@
                 </a:tc>
                 <a:extLst>
                   <a:ext uri="{0D108BD9-81ED-4DB2-BD59-A6C34878D82A}">
-                    <a16:rowId xmlns="" xmlns:a16="http://schemas.microsoft.com/office/drawing/2014/main" val="10002"/>
+                    <a16:rowId xmlns:a16="http://schemas.microsoft.com/office/drawing/2014/main" xmlns="" val="10002"/>
                   </a:ext>
                 </a:extLst>
               </a:tr>
@@ -9859,7 +9860,7 @@
                 </a:tc>
                 <a:extLst>
                   <a:ext uri="{0D108BD9-81ED-4DB2-BD59-A6C34878D82A}">
-                    <a16:rowId xmlns="" xmlns:a16="http://schemas.microsoft.com/office/drawing/2014/main" val="10003"/>
+                    <a16:rowId xmlns:a16="http://schemas.microsoft.com/office/drawing/2014/main" xmlns="" val="10003"/>
                   </a:ext>
                 </a:extLst>
               </a:tr>
@@ -9948,7 +9949,7 @@
                 </a:tc>
                 <a:extLst>
                   <a:ext uri="{0D108BD9-81ED-4DB2-BD59-A6C34878D82A}">
-                    <a16:rowId xmlns="" xmlns:a16="http://schemas.microsoft.com/office/drawing/2014/main" val="10004"/>
+                    <a16:rowId xmlns:a16="http://schemas.microsoft.com/office/drawing/2014/main" xmlns="" val="10004"/>
                   </a:ext>
                 </a:extLst>
               </a:tr>
@@ -10384,7 +10385,7 @@
                 </a:tc>
                 <a:extLst>
                   <a:ext uri="{0D108BD9-81ED-4DB2-BD59-A6C34878D82A}">
-                    <a16:rowId xmlns="" xmlns:a16="http://schemas.microsoft.com/office/drawing/2014/main" val="10005"/>
+                    <a16:rowId xmlns:a16="http://schemas.microsoft.com/office/drawing/2014/main" xmlns="" val="10005"/>
                   </a:ext>
                 </a:extLst>
               </a:tr>
@@ -15688,14 +15689,14 @@
                 <a:gridCol w="2718377">
                   <a:extLst>
                     <a:ext uri="{9D8B030D-6E8A-4147-A177-3AD203B41FA5}">
-                      <a16:colId xmlns="" xmlns:a16="http://schemas.microsoft.com/office/drawing/2014/main" val="20000"/>
+                      <a16:colId xmlns:a16="http://schemas.microsoft.com/office/drawing/2014/main" xmlns="" val="20000"/>
                     </a:ext>
                   </a:extLst>
                 </a:gridCol>
                 <a:gridCol w="3061961">
                   <a:extLst>
                     <a:ext uri="{9D8B030D-6E8A-4147-A177-3AD203B41FA5}">
-                      <a16:colId xmlns="" xmlns:a16="http://schemas.microsoft.com/office/drawing/2014/main" val="20001"/>
+                      <a16:colId xmlns:a16="http://schemas.microsoft.com/office/drawing/2014/main" xmlns="" val="20001"/>
                     </a:ext>
                   </a:extLst>
                 </a:gridCol>
@@ -16009,7 +16010,7 @@
                 </a:tc>
                 <a:extLst>
                   <a:ext uri="{0D108BD9-81ED-4DB2-BD59-A6C34878D82A}">
-                    <a16:rowId xmlns="" xmlns:a16="http://schemas.microsoft.com/office/drawing/2014/main" val="10000"/>
+                    <a16:rowId xmlns:a16="http://schemas.microsoft.com/office/drawing/2014/main" xmlns="" val="10000"/>
                   </a:ext>
                 </a:extLst>
               </a:tr>
@@ -16331,7 +16332,7 @@
                 </a:tc>
                 <a:extLst>
                   <a:ext uri="{0D108BD9-81ED-4DB2-BD59-A6C34878D82A}">
-                    <a16:rowId xmlns="" xmlns:a16="http://schemas.microsoft.com/office/drawing/2014/main" val="10001"/>
+                    <a16:rowId xmlns:a16="http://schemas.microsoft.com/office/drawing/2014/main" xmlns="" val="10001"/>
                   </a:ext>
                 </a:extLst>
               </a:tr>
@@ -16644,7 +16645,7 @@
                 </a:tc>
                 <a:extLst>
                   <a:ext uri="{0D108BD9-81ED-4DB2-BD59-A6C34878D82A}">
-                    <a16:rowId xmlns="" xmlns:a16="http://schemas.microsoft.com/office/drawing/2014/main" val="10002"/>
+                    <a16:rowId xmlns:a16="http://schemas.microsoft.com/office/drawing/2014/main" xmlns="" val="10002"/>
                   </a:ext>
                 </a:extLst>
               </a:tr>
@@ -16957,7 +16958,7 @@
                 </a:tc>
                 <a:extLst>
                   <a:ext uri="{0D108BD9-81ED-4DB2-BD59-A6C34878D82A}">
-                    <a16:rowId xmlns="" xmlns:a16="http://schemas.microsoft.com/office/drawing/2014/main" val="10003"/>
+                    <a16:rowId xmlns:a16="http://schemas.microsoft.com/office/drawing/2014/main" xmlns="" val="10003"/>
                   </a:ext>
                 </a:extLst>
               </a:tr>
@@ -17270,7 +17271,7 @@
                 </a:tc>
                 <a:extLst>
                   <a:ext uri="{0D108BD9-81ED-4DB2-BD59-A6C34878D82A}">
-                    <a16:rowId xmlns="" xmlns:a16="http://schemas.microsoft.com/office/drawing/2014/main" val="10004"/>
+                    <a16:rowId xmlns:a16="http://schemas.microsoft.com/office/drawing/2014/main" xmlns="" val="10004"/>
                   </a:ext>
                 </a:extLst>
               </a:tr>
@@ -17583,7 +17584,7 @@
                 </a:tc>
                 <a:extLst>
                   <a:ext uri="{0D108BD9-81ED-4DB2-BD59-A6C34878D82A}">
-                    <a16:rowId xmlns="" xmlns:a16="http://schemas.microsoft.com/office/drawing/2014/main" val="10005"/>
+                    <a16:rowId xmlns:a16="http://schemas.microsoft.com/office/drawing/2014/main" xmlns="" val="10005"/>
                   </a:ext>
                 </a:extLst>
               </a:tr>
@@ -17896,7 +17897,7 @@
                 </a:tc>
                 <a:extLst>
                   <a:ext uri="{0D108BD9-81ED-4DB2-BD59-A6C34878D82A}">
-                    <a16:rowId xmlns="" xmlns:a16="http://schemas.microsoft.com/office/drawing/2014/main" val="10006"/>
+                    <a16:rowId xmlns:a16="http://schemas.microsoft.com/office/drawing/2014/main" xmlns="" val="10006"/>
                   </a:ext>
                 </a:extLst>
               </a:tr>
@@ -18209,7 +18210,7 @@
                 </a:tc>
                 <a:extLst>
                   <a:ext uri="{0D108BD9-81ED-4DB2-BD59-A6C34878D82A}">
-                    <a16:rowId xmlns="" xmlns:a16="http://schemas.microsoft.com/office/drawing/2014/main" val="10007"/>
+                    <a16:rowId xmlns:a16="http://schemas.microsoft.com/office/drawing/2014/main" xmlns="" val="10007"/>
                   </a:ext>
                 </a:extLst>
               </a:tr>
@@ -18522,7 +18523,7 @@
                 </a:tc>
                 <a:extLst>
                   <a:ext uri="{0D108BD9-81ED-4DB2-BD59-A6C34878D82A}">
-                    <a16:rowId xmlns="" xmlns:a16="http://schemas.microsoft.com/office/drawing/2014/main" val="10008"/>
+                    <a16:rowId xmlns:a16="http://schemas.microsoft.com/office/drawing/2014/main" xmlns="" val="10008"/>
                   </a:ext>
                 </a:extLst>
               </a:tr>
@@ -18847,7 +18848,7 @@
                 </a:tc>
                 <a:extLst>
                   <a:ext uri="{0D108BD9-81ED-4DB2-BD59-A6C34878D82A}">
-                    <a16:rowId xmlns="" xmlns:a16="http://schemas.microsoft.com/office/drawing/2014/main" val="10009"/>
+                    <a16:rowId xmlns:a16="http://schemas.microsoft.com/office/drawing/2014/main" xmlns="" val="10009"/>
                   </a:ext>
                 </a:extLst>
               </a:tr>
@@ -19005,7 +19006,7 @@
                 </a:tc>
                 <a:extLst>
                   <a:ext uri="{0D108BD9-81ED-4DB2-BD59-A6C34878D82A}">
-                    <a16:rowId xmlns="" xmlns:a16="http://schemas.microsoft.com/office/drawing/2014/main" val="10010"/>
+                    <a16:rowId xmlns:a16="http://schemas.microsoft.com/office/drawing/2014/main" xmlns="" val="10010"/>
                   </a:ext>
                 </a:extLst>
               </a:tr>
@@ -19041,14 +19042,14 @@
                 <a:gridCol w="2748286">
                   <a:extLst>
                     <a:ext uri="{9D8B030D-6E8A-4147-A177-3AD203B41FA5}">
-                      <a16:colId xmlns="" xmlns:a16="http://schemas.microsoft.com/office/drawing/2014/main" val="20000"/>
+                      <a16:colId xmlns:a16="http://schemas.microsoft.com/office/drawing/2014/main" xmlns="" val="20000"/>
                     </a:ext>
                   </a:extLst>
                 </a:gridCol>
                 <a:gridCol w="3032053">
                   <a:extLst>
                     <a:ext uri="{9D8B030D-6E8A-4147-A177-3AD203B41FA5}">
-                      <a16:colId xmlns="" xmlns:a16="http://schemas.microsoft.com/office/drawing/2014/main" val="20001"/>
+                      <a16:colId xmlns:a16="http://schemas.microsoft.com/office/drawing/2014/main" xmlns="" val="20001"/>
                     </a:ext>
                   </a:extLst>
                 </a:gridCol>
@@ -19097,7 +19098,7 @@
                 </a:tc>
                 <a:extLst>
                   <a:ext uri="{0D108BD9-81ED-4DB2-BD59-A6C34878D82A}">
-                    <a16:rowId xmlns="" xmlns:a16="http://schemas.microsoft.com/office/drawing/2014/main" val="10000"/>
+                    <a16:rowId xmlns:a16="http://schemas.microsoft.com/office/drawing/2014/main" xmlns="" val="10000"/>
                   </a:ext>
                 </a:extLst>
               </a:tr>
@@ -19133,14 +19134,14 @@
                 <a:gridCol w="2729702">
                   <a:extLst>
                     <a:ext uri="{9D8B030D-6E8A-4147-A177-3AD203B41FA5}">
-                      <a16:colId xmlns="" xmlns:a16="http://schemas.microsoft.com/office/drawing/2014/main" val="20000"/>
+                      <a16:colId xmlns:a16="http://schemas.microsoft.com/office/drawing/2014/main" xmlns="" val="20000"/>
                     </a:ext>
                   </a:extLst>
                 </a:gridCol>
                 <a:gridCol w="3011548">
                   <a:extLst>
                     <a:ext uri="{9D8B030D-6E8A-4147-A177-3AD203B41FA5}">
-                      <a16:colId xmlns="" xmlns:a16="http://schemas.microsoft.com/office/drawing/2014/main" val="20001"/>
+                      <a16:colId xmlns:a16="http://schemas.microsoft.com/office/drawing/2014/main" xmlns="" val="20001"/>
                     </a:ext>
                   </a:extLst>
                 </a:gridCol>
@@ -19189,7 +19190,7 @@
                 </a:tc>
                 <a:extLst>
                   <a:ext uri="{0D108BD9-81ED-4DB2-BD59-A6C34878D82A}">
-                    <a16:rowId xmlns="" xmlns:a16="http://schemas.microsoft.com/office/drawing/2014/main" val="10000"/>
+                    <a16:rowId xmlns:a16="http://schemas.microsoft.com/office/drawing/2014/main" xmlns="" val="10000"/>
                   </a:ext>
                 </a:extLst>
               </a:tr>
@@ -21876,7 +21877,6 @@
               <a:rPr lang="en-US" sz="1600" dirty="0"/>
               <a:t> file.</a:t>
             </a:r>
-            <a:endParaRPr lang="en-US" sz="1600" dirty="0"/>
           </a:p>
         </p:txBody>
       </p:sp>
@@ -22962,17 +22962,8 @@
             </a:r>
             <a:r>
               <a:rPr lang="en-US" dirty="0"/>
-              <a:t>Update</a:t>
-            </a:r>
-            <a:r>
-              <a:rPr lang="en-US" dirty="0"/>
-              <a:t> </a:t>
-            </a:r>
-            <a:r>
-              <a:rPr lang="en-US" dirty="0"/>
-              <a:t>Document</a:t>
-            </a:r>
-            <a:endParaRPr lang="en-US" dirty="0"/>
+              <a:t>Update Document</a:t>
+            </a:r>
           </a:p>
         </p:txBody>
       </p:sp>
@@ -23330,7 +23321,6 @@
               <a:rPr lang="en-US" dirty="0"/>
               <a:t>Document</a:t>
             </a:r>
-            <a:endParaRPr lang="en-US" dirty="0"/>
           </a:p>
         </p:txBody>
       </p:sp>
@@ -23371,7 +23361,6 @@
               <a:rPr lang="en-US" sz="1800" dirty="0"/>
               <a:t> method updates the values in the existing document.</a:t>
             </a:r>
-            <a:endParaRPr lang="en-US" sz="1800" dirty="0"/>
           </a:p>
         </p:txBody>
       </p:sp>
@@ -23575,7 +23564,6 @@
               <a:rPr lang="en-US" dirty="0"/>
               <a:t>Document</a:t>
             </a:r>
-            <a:endParaRPr lang="en-US" dirty="0"/>
           </a:p>
         </p:txBody>
       </p:sp>
@@ -23612,7 +23600,6 @@
               <a:rPr lang="en-US" sz="1800" dirty="0"/>
               <a:t>() method updates all the documents that matches the given filter.</a:t>
             </a:r>
-            <a:endParaRPr lang="en-US" sz="1800" dirty="0"/>
           </a:p>
         </p:txBody>
       </p:sp>
@@ -24054,13 +24041,8 @@
           <a:p>
             <a:r>
               <a:rPr lang="en-US" dirty="0"/>
-              <a:t>Mongo DB Fundamentals: </a:t>
-            </a:r>
-            <a:r>
-              <a:rPr lang="en-US" dirty="0"/>
-              <a:t>Aggregation</a:t>
-            </a:r>
-            <a:endParaRPr lang="en-US" dirty="0"/>
+              <a:t>Mongo DB Fundamentals: Aggregation</a:t>
+            </a:r>
           </a:p>
         </p:txBody>
       </p:sp>
@@ -24180,7 +24162,6 @@
               <a:rPr lang="en-US" sz="1800" dirty="0"/>
               <a:t>The aggregation pipeline is a framework for data aggregation modeled on the concept of data processing pipelines. Documents enter a multi-stage pipeline that transforms the documents into aggregated results.</a:t>
             </a:r>
-            <a:endParaRPr lang="en-US" sz="1800" dirty="0"/>
           </a:p>
         </p:txBody>
       </p:sp>
@@ -24328,13 +24309,70 @@
             </a:pPr>
             <a:r>
               <a:rPr lang="en-US" sz="1800" dirty="0"/>
-              <a:t>Replication is the process of synchronizing data across multiple servers. </a:t>
-            </a:r>
-            <a:r>
-              <a:rPr lang="en-US" sz="1800"/>
-              <a:t>Replication provides redundancy and increases data availability with multiple copies of data on different database servers.</a:t>
-            </a:r>
-            <a:endParaRPr lang="en-US" sz="1800" dirty="0"/>
+              <a:t>Relationships in </a:t>
+            </a:r>
+            <a:r>
+              <a:rPr lang="en-US" sz="1800" dirty="0" err="1"/>
+              <a:t>MongoDB</a:t>
+            </a:r>
+            <a:r>
+              <a:rPr lang="en-US" sz="1800" dirty="0"/>
+              <a:t> represent how various documents are logically related to each other. Relationships can be modeled via </a:t>
+            </a:r>
+            <a:r>
+              <a:rPr lang="en-US" sz="1800" b="1" dirty="0"/>
+              <a:t>Embedded</a:t>
+            </a:r>
+            <a:r>
+              <a:rPr lang="en-US" sz="1800" dirty="0"/>
+              <a:t> and </a:t>
+            </a:r>
+            <a:r>
+              <a:rPr lang="en-US" sz="1800" b="1" dirty="0"/>
+              <a:t>Referenced</a:t>
+            </a:r>
+            <a:r>
+              <a:rPr lang="en-US" sz="1800" dirty="0"/>
+              <a:t> approaches. Such relationships can be either 1:1, 1:N, N:1 or N:N.</a:t>
+            </a:r>
+          </a:p>
+          <a:p>
+            <a:pPr marL="0" indent="0">
+              <a:buNone/>
+            </a:pPr>
+            <a:r>
+              <a:rPr lang="en-US" sz="1800" dirty="0"/>
+              <a:t>Let us consider the case of storing addresses for users. So, one user can have multiple addresses making this a 1:N relationship</a:t>
+            </a:r>
+            <a:r>
+              <a:rPr lang="en-US" sz="1800" dirty="0" smtClean="0"/>
+              <a:t>.</a:t>
+            </a:r>
+          </a:p>
+          <a:p>
+            <a:pPr marL="0" indent="0">
+              <a:buNone/>
+            </a:pPr>
+            <a:r>
+              <a:rPr lang="en-US" sz="1800" b="1" dirty="0"/>
+              <a:t>Embedded </a:t>
+            </a:r>
+            <a:r>
+              <a:rPr lang="en-US" sz="1800" b="1" dirty="0" smtClean="0"/>
+              <a:t>Relationships:</a:t>
+            </a:r>
+          </a:p>
+          <a:p>
+            <a:pPr marL="0" indent="0">
+              <a:buNone/>
+            </a:pPr>
+            <a:endParaRPr lang="en-US" sz="1800" b="1" dirty="0"/>
+          </a:p>
+          <a:p>
+            <a:pPr marL="0" indent="0">
+              <a:buNone/>
+            </a:pPr>
+            <a:endParaRPr lang="en-US" sz="1800" b="1" dirty="0"/>
           </a:p>
         </p:txBody>
       </p:sp>
@@ -24364,12 +24402,75 @@
             </a:r>
             <a:r>
               <a:rPr lang="en-US" dirty="0"/>
-              <a:t>Replication</a:t>
-            </a:r>
-            <a:endParaRPr lang="en-US" dirty="0"/>
+              <a:t>Relationships</a:t>
+            </a:r>
           </a:p>
         </p:txBody>
       </p:sp>
+      <p:pic>
+        <p:nvPicPr>
+          <p:cNvPr id="1026" name="Picture 2"/>
+          <p:cNvPicPr>
+            <a:picLocks noChangeAspect="1" noChangeArrowheads="1"/>
+          </p:cNvPicPr>
+          <p:nvPr/>
+        </p:nvPicPr>
+        <p:blipFill>
+          <a:blip r:embed="rId2">
+            <a:extLst>
+              <a:ext uri="{28A0092B-C50C-407E-A947-70E740481C1C}">
+                <a14:useLocalDpi xmlns:a14="http://schemas.microsoft.com/office/drawing/2010/main" val="0"/>
+              </a:ext>
+            </a:extLst>
+          </a:blip>
+          <a:srcRect/>
+          <a:stretch>
+            <a:fillRect/>
+          </a:stretch>
+        </p:blipFill>
+        <p:spPr bwMode="auto">
+          <a:xfrm>
+            <a:off x="3216519" y="2680189"/>
+            <a:ext cx="4305300" cy="3771900"/>
+          </a:xfrm>
+          <a:prstGeom prst="rect">
+            <a:avLst/>
+          </a:prstGeom>
+          <a:noFill/>
+          <a:ln>
+            <a:noFill/>
+          </a:ln>
+          <a:effectLst/>
+          <a:extLst>
+            <a:ext uri="{909E8E84-426E-40DD-AFC4-6F175D3DCCD1}">
+              <a14:hiddenFill xmlns:a14="http://schemas.microsoft.com/office/drawing/2010/main">
+                <a:solidFill>
+                  <a:schemeClr val="accent1"/>
+                </a:solidFill>
+              </a14:hiddenFill>
+            </a:ext>
+            <a:ext uri="{91240B29-F687-4F45-9708-019B960494DF}">
+              <a14:hiddenLine xmlns:a14="http://schemas.microsoft.com/office/drawing/2010/main" w="9525">
+                <a:solidFill>
+                  <a:schemeClr val="tx1"/>
+                </a:solidFill>
+                <a:miter lim="800000"/>
+                <a:headEnd/>
+                <a:tailEnd/>
+              </a14:hiddenLine>
+            </a:ext>
+            <a:ext uri="{AF507438-7753-43E0-B8FC-AC1667EBCBE1}">
+              <a14:hiddenEffects xmlns:a14="http://schemas.microsoft.com/office/drawing/2010/main">
+                <a:effectLst>
+                  <a:outerShdw dist="35921" dir="2700000" algn="ctr" rotWithShape="0">
+                    <a:schemeClr val="bg2"/>
+                  </a:outerShdw>
+                </a:effectLst>
+              </a14:hiddenEffects>
+            </a:ext>
+          </a:extLst>
+        </p:spPr>
+      </p:pic>
     </p:spTree>
     <p:extLst>
       <p:ext uri="{BB962C8B-B14F-4D97-AF65-F5344CB8AC3E}">
@@ -24384,6 +24485,421 @@
 </file>
 
 <file path=ppt/slides/slide26.xml><?xml version="1.0" encoding="utf-8"?>
+<p:sld xmlns:a="http://schemas.openxmlformats.org/drawingml/2006/main" xmlns:r="http://schemas.openxmlformats.org/officeDocument/2006/relationships" xmlns:p="http://schemas.openxmlformats.org/presentationml/2006/main">
+  <p:cSld>
+    <p:spTree>
+      <p:nvGrpSpPr>
+        <p:cNvPr id="1" name=""/>
+        <p:cNvGrpSpPr/>
+        <p:nvPr/>
+      </p:nvGrpSpPr>
+      <p:grpSpPr>
+        <a:xfrm>
+          <a:off x="0" y="0"/>
+          <a:ext cx="0" cy="0"/>
+          <a:chOff x="0" y="0"/>
+          <a:chExt cx="0" cy="0"/>
+        </a:xfrm>
+      </p:grpSpPr>
+      <p:sp>
+        <p:nvSpPr>
+          <p:cNvPr id="2" name="Content Placeholder 1"/>
+          <p:cNvSpPr>
+            <a:spLocks noGrp="1"/>
+          </p:cNvSpPr>
+          <p:nvPr>
+            <p:ph idx="1"/>
+          </p:nvPr>
+        </p:nvSpPr>
+        <p:spPr>
+          <a:xfrm>
+            <a:off x="287338" y="1139688"/>
+            <a:ext cx="8382000" cy="498612"/>
+          </a:xfrm>
+        </p:spPr>
+        <p:txBody>
+          <a:bodyPr/>
+          <a:lstStyle/>
+          <a:p>
+            <a:pPr marL="0" indent="0">
+              <a:buNone/>
+            </a:pPr>
+            <a:r>
+              <a:rPr lang="en-US" sz="1800" b="1" dirty="0" smtClean="0"/>
+              <a:t>Referenced Relationships: </a:t>
+            </a:r>
+            <a:r>
+              <a:rPr lang="en-US" sz="1800" dirty="0" smtClean="0"/>
+              <a:t>This </a:t>
+            </a:r>
+            <a:r>
+              <a:rPr lang="en-US" sz="1800" dirty="0"/>
+              <a:t>is the approach of designing normalized relationship.</a:t>
+            </a:r>
+            <a:endParaRPr lang="en-US" sz="1800" b="1" dirty="0" smtClean="0"/>
+          </a:p>
+          <a:p>
+            <a:pPr marL="0" indent="0">
+              <a:buNone/>
+            </a:pPr>
+            <a:endParaRPr lang="en-US" sz="1800" b="1" dirty="0"/>
+          </a:p>
+          <a:p>
+            <a:pPr marL="0" indent="0">
+              <a:buNone/>
+            </a:pPr>
+            <a:endParaRPr lang="en-US" sz="1800" b="1" dirty="0"/>
+          </a:p>
+        </p:txBody>
+      </p:sp>
+      <p:sp>
+        <p:nvSpPr>
+          <p:cNvPr id="3" name="Title 2"/>
+          <p:cNvSpPr>
+            <a:spLocks noGrp="1"/>
+          </p:cNvSpPr>
+          <p:nvPr>
+            <p:ph type="title"/>
+          </p:nvPr>
+        </p:nvSpPr>
+        <p:spPr>
+          <a:xfrm>
+            <a:off x="304800" y="667627"/>
+            <a:ext cx="8382000" cy="276999"/>
+          </a:xfrm>
+        </p:spPr>
+        <p:txBody>
+          <a:bodyPr/>
+          <a:lstStyle/>
+          <a:p>
+            <a:r>
+              <a:rPr lang="en-US" dirty="0"/>
+              <a:t>Mongo DB Fundamentals: </a:t>
+            </a:r>
+            <a:r>
+              <a:rPr lang="en-US" dirty="0"/>
+              <a:t>Relationships</a:t>
+            </a:r>
+            <a:endParaRPr lang="en-US" dirty="0"/>
+          </a:p>
+        </p:txBody>
+      </p:sp>
+      <p:pic>
+        <p:nvPicPr>
+          <p:cNvPr id="2050" name="Picture 2"/>
+          <p:cNvPicPr>
+            <a:picLocks noChangeAspect="1" noChangeArrowheads="1"/>
+          </p:cNvPicPr>
+          <p:nvPr/>
+        </p:nvPicPr>
+        <p:blipFill rotWithShape="1">
+          <a:blip r:embed="rId2">
+            <a:extLst>
+              <a:ext uri="{28A0092B-C50C-407E-A947-70E740481C1C}">
+                <a14:useLocalDpi xmlns:a14="http://schemas.microsoft.com/office/drawing/2010/main" val="0"/>
+              </a:ext>
+            </a:extLst>
+          </a:blip>
+          <a:srcRect b="17574"/>
+          <a:stretch/>
+        </p:blipFill>
+        <p:spPr bwMode="auto">
+          <a:xfrm>
+            <a:off x="158384" y="3367096"/>
+            <a:ext cx="2732087" cy="3138479"/>
+          </a:xfrm>
+          <a:prstGeom prst="rect">
+            <a:avLst/>
+          </a:prstGeom>
+          <a:noFill/>
+          <a:ln>
+            <a:noFill/>
+          </a:ln>
+          <a:effectLst/>
+          <a:extLst>
+            <a:ext uri="{909E8E84-426E-40DD-AFC4-6F175D3DCCD1}">
+              <a14:hiddenFill xmlns:a14="http://schemas.microsoft.com/office/drawing/2010/main">
+                <a:solidFill>
+                  <a:schemeClr val="accent1"/>
+                </a:solidFill>
+              </a14:hiddenFill>
+            </a:ext>
+            <a:ext uri="{91240B29-F687-4F45-9708-019B960494DF}">
+              <a14:hiddenLine xmlns:a14="http://schemas.microsoft.com/office/drawing/2010/main" w="9525">
+                <a:solidFill>
+                  <a:schemeClr val="tx1"/>
+                </a:solidFill>
+                <a:miter lim="800000"/>
+                <a:headEnd/>
+                <a:tailEnd/>
+              </a14:hiddenLine>
+            </a:ext>
+            <a:ext uri="{AF507438-7753-43E0-B8FC-AC1667EBCBE1}">
+              <a14:hiddenEffects xmlns:a14="http://schemas.microsoft.com/office/drawing/2010/main">
+                <a:effectLst>
+                  <a:outerShdw dist="35921" dir="2700000" algn="ctr" rotWithShape="0">
+                    <a:schemeClr val="bg2"/>
+                  </a:outerShdw>
+                </a:effectLst>
+              </a14:hiddenEffects>
+            </a:ext>
+          </a:extLst>
+        </p:spPr>
+      </p:pic>
+      <p:pic>
+        <p:nvPicPr>
+          <p:cNvPr id="2051" name="Picture 3"/>
+          <p:cNvPicPr>
+            <a:picLocks noChangeAspect="1" noChangeArrowheads="1"/>
+          </p:cNvPicPr>
+          <p:nvPr/>
+        </p:nvPicPr>
+        <p:blipFill>
+          <a:blip r:embed="rId3">
+            <a:extLst>
+              <a:ext uri="{28A0092B-C50C-407E-A947-70E740481C1C}">
+                <a14:useLocalDpi xmlns:a14="http://schemas.microsoft.com/office/drawing/2010/main" val="0"/>
+              </a:ext>
+            </a:extLst>
+          </a:blip>
+          <a:srcRect/>
+          <a:stretch>
+            <a:fillRect/>
+          </a:stretch>
+        </p:blipFill>
+        <p:spPr bwMode="auto">
+          <a:xfrm>
+            <a:off x="158384" y="1749401"/>
+            <a:ext cx="8805373" cy="1165249"/>
+          </a:xfrm>
+          <a:prstGeom prst="rect">
+            <a:avLst/>
+          </a:prstGeom>
+          <a:noFill/>
+          <a:ln>
+            <a:noFill/>
+          </a:ln>
+          <a:effectLst/>
+          <a:extLst>
+            <a:ext uri="{909E8E84-426E-40DD-AFC4-6F175D3DCCD1}">
+              <a14:hiddenFill xmlns:a14="http://schemas.microsoft.com/office/drawing/2010/main">
+                <a:solidFill>
+                  <a:schemeClr val="accent1"/>
+                </a:solidFill>
+              </a14:hiddenFill>
+            </a:ext>
+            <a:ext uri="{91240B29-F687-4F45-9708-019B960494DF}">
+              <a14:hiddenLine xmlns:a14="http://schemas.microsoft.com/office/drawing/2010/main" w="9525">
+                <a:solidFill>
+                  <a:schemeClr val="tx1"/>
+                </a:solidFill>
+                <a:miter lim="800000"/>
+                <a:headEnd/>
+                <a:tailEnd/>
+              </a14:hiddenLine>
+            </a:ext>
+            <a:ext uri="{AF507438-7753-43E0-B8FC-AC1667EBCBE1}">
+              <a14:hiddenEffects xmlns:a14="http://schemas.microsoft.com/office/drawing/2010/main">
+                <a:effectLst>
+                  <a:outerShdw dist="35921" dir="2700000" algn="ctr" rotWithShape="0">
+                    <a:schemeClr val="bg2"/>
+                  </a:outerShdw>
+                </a:effectLst>
+              </a14:hiddenEffects>
+            </a:ext>
+          </a:extLst>
+        </p:spPr>
+      </p:pic>
+      <p:sp>
+        <p:nvSpPr>
+          <p:cNvPr id="4" name="Rectangle 4"/>
+          <p:cNvSpPr>
+            <a:spLocks noChangeArrowheads="1"/>
+          </p:cNvSpPr>
+          <p:nvPr/>
+        </p:nvSpPr>
+        <p:spPr bwMode="auto">
+          <a:xfrm>
+            <a:off x="0" y="0"/>
+            <a:ext cx="9144000" cy="457200"/>
+          </a:xfrm>
+          <a:prstGeom prst="rect">
+            <a:avLst/>
+          </a:prstGeom>
+          <a:solidFill>
+            <a:srgbClr val="EEEEEE"/>
+          </a:solidFill>
+          <a:ln>
+            <a:noFill/>
+          </a:ln>
+          <a:effectLst/>
+          <a:extLst>
+            <a:ext uri="{91240B29-F687-4F45-9708-019B960494DF}">
+              <a14:hiddenLine xmlns:a14="http://schemas.microsoft.com/office/drawing/2010/main" w="9525">
+                <a:solidFill>
+                  <a:schemeClr val="tx1"/>
+                </a:solidFill>
+                <a:miter lim="800000"/>
+                <a:headEnd/>
+                <a:tailEnd/>
+              </a14:hiddenLine>
+            </a:ext>
+            <a:ext uri="{AF507438-7753-43E0-B8FC-AC1667EBCBE1}">
+              <a14:hiddenEffects xmlns:a14="http://schemas.microsoft.com/office/drawing/2010/main">
+                <a:effectLst>
+                  <a:outerShdw dist="35921" dir="2700000" algn="ctr" rotWithShape="0">
+                    <a:schemeClr val="bg2"/>
+                  </a:outerShdw>
+                </a:effectLst>
+              </a14:hiddenEffects>
+            </a:ext>
+          </a:extLst>
+        </p:spPr>
+        <p:txBody>
+          <a:bodyPr vert="horz" wrap="none" lIns="91440" tIns="0" rIns="91440" bIns="45720" numCol="1" anchor="ctr" anchorCtr="0" compatLnSpc="1">
+            <a:prstTxWarp prst="textNoShape">
+              <a:avLst/>
+            </a:prstTxWarp>
+            <a:spAutoFit/>
+          </a:bodyPr>
+          <a:lstStyle/>
+          <a:p>
+            <a:pPr marL="0" marR="0" lvl="0" indent="0" algn="l" defTabSz="914400" rtl="0" eaLnBrk="1" fontAlgn="base" latinLnBrk="0" hangingPunct="1">
+              <a:lnSpc>
+                <a:spcPct val="100000"/>
+              </a:lnSpc>
+              <a:spcBef>
+                <a:spcPct val="0"/>
+              </a:spcBef>
+              <a:spcAft>
+                <a:spcPct val="0"/>
+              </a:spcAft>
+              <a:buClrTx/>
+              <a:buSzTx/>
+              <a:buFontTx/>
+              <a:buNone/>
+              <a:tabLst/>
+            </a:pPr>
+            <a:r>
+              <a:rPr kumimoji="0" lang="en-US" sz="1100" b="0" i="0" u="none" strike="noStrike" cap="none" normalizeH="0" baseline="0" smtClean="0">
+                <a:ln>
+                  <a:noFill/>
+                </a:ln>
+                <a:solidFill>
+                  <a:srgbClr val="000000"/>
+                </a:solidFill>
+                <a:effectLst/>
+                <a:latin typeface="var(--bs-font-monospace)"/>
+                <a:cs typeface="Arial" pitchFamily="34" charset="0"/>
+              </a:rPr>
+              <a:t>var addresses = db.address.find({"_id":{"$in":result["address_ids"]}})</a:t>
+            </a:r>
+            <a:r>
+              <a:rPr kumimoji="0" lang="en-US" sz="800" b="0" i="0" u="none" strike="noStrike" cap="none" normalizeH="0" baseline="0" smtClean="0">
+                <a:ln>
+                  <a:noFill/>
+                </a:ln>
+                <a:solidFill>
+                  <a:schemeClr val="tx1"/>
+                </a:solidFill>
+                <a:effectLst/>
+                <a:latin typeface="Arial" pitchFamily="34" charset="0"/>
+                <a:cs typeface="Arial" pitchFamily="34" charset="0"/>
+              </a:rPr>
+              <a:t> </a:t>
+            </a:r>
+            <a:endParaRPr kumimoji="0" lang="en-US" sz="1800" b="0" i="0" u="none" strike="noStrike" cap="none" normalizeH="0" baseline="0" smtClean="0">
+              <a:ln>
+                <a:noFill/>
+              </a:ln>
+              <a:solidFill>
+                <a:schemeClr val="tx1"/>
+              </a:solidFill>
+              <a:effectLst/>
+              <a:latin typeface="Arial" pitchFamily="34" charset="0"/>
+              <a:cs typeface="Arial" pitchFamily="34" charset="0"/>
+            </a:endParaRPr>
+          </a:p>
+        </p:txBody>
+      </p:sp>
+      <p:pic>
+        <p:nvPicPr>
+          <p:cNvPr id="2053" name="Picture 5"/>
+          <p:cNvPicPr>
+            <a:picLocks noChangeAspect="1" noChangeArrowheads="1"/>
+          </p:cNvPicPr>
+          <p:nvPr/>
+        </p:nvPicPr>
+        <p:blipFill>
+          <a:blip r:embed="rId4">
+            <a:extLst>
+              <a:ext uri="{28A0092B-C50C-407E-A947-70E740481C1C}">
+                <a14:useLocalDpi xmlns:a14="http://schemas.microsoft.com/office/drawing/2010/main" val="0"/>
+              </a:ext>
+            </a:extLst>
+          </a:blip>
+          <a:srcRect/>
+          <a:stretch>
+            <a:fillRect/>
+          </a:stretch>
+        </p:blipFill>
+        <p:spPr bwMode="auto">
+          <a:xfrm>
+            <a:off x="3312332" y="3136907"/>
+            <a:ext cx="5562600" cy="3368668"/>
+          </a:xfrm>
+          <a:prstGeom prst="rect">
+            <a:avLst/>
+          </a:prstGeom>
+          <a:noFill/>
+          <a:ln>
+            <a:noFill/>
+          </a:ln>
+          <a:effectLst/>
+          <a:extLst>
+            <a:ext uri="{909E8E84-426E-40DD-AFC4-6F175D3DCCD1}">
+              <a14:hiddenFill xmlns:a14="http://schemas.microsoft.com/office/drawing/2010/main">
+                <a:solidFill>
+                  <a:schemeClr val="accent1"/>
+                </a:solidFill>
+              </a14:hiddenFill>
+            </a:ext>
+            <a:ext uri="{91240B29-F687-4F45-9708-019B960494DF}">
+              <a14:hiddenLine xmlns:a14="http://schemas.microsoft.com/office/drawing/2010/main" w="9525">
+                <a:solidFill>
+                  <a:schemeClr val="tx1"/>
+                </a:solidFill>
+                <a:miter lim="800000"/>
+                <a:headEnd/>
+                <a:tailEnd/>
+              </a14:hiddenLine>
+            </a:ext>
+            <a:ext uri="{AF507438-7753-43E0-B8FC-AC1667EBCBE1}">
+              <a14:hiddenEffects xmlns:a14="http://schemas.microsoft.com/office/drawing/2010/main">
+                <a:effectLst>
+                  <a:outerShdw dist="35921" dir="2700000" algn="ctr" rotWithShape="0">
+                    <a:schemeClr val="bg2"/>
+                  </a:outerShdw>
+                </a:effectLst>
+              </a14:hiddenEffects>
+            </a:ext>
+          </a:extLst>
+        </p:spPr>
+      </p:pic>
+    </p:spTree>
+    <p:extLst>
+      <p:ext uri="{BB962C8B-B14F-4D97-AF65-F5344CB8AC3E}">
+        <p14:creationId xmlns:p14="http://schemas.microsoft.com/office/powerpoint/2010/main" val="1082650373"/>
+      </p:ext>
+    </p:extLst>
+  </p:cSld>
+  <p:clrMapOvr>
+    <a:masterClrMapping/>
+  </p:clrMapOvr>
+</p:sld>
+</file>
+
+<file path=ppt/slides/slide27.xml><?xml version="1.0" encoding="utf-8"?>
 <p:sld xmlns:a="http://schemas.openxmlformats.org/drawingml/2006/main" xmlns:r="http://schemas.openxmlformats.org/officeDocument/2006/relationships" xmlns:p="http://schemas.openxmlformats.org/presentationml/2006/main">
   <p:cSld>
     <p:spTree>
@@ -24428,6 +24944,90 @@
           </a:p>
         </p:txBody>
       </p:sp>
+      <p:sp>
+        <p:nvSpPr>
+          <p:cNvPr id="2" name="Rectangle 1"/>
+          <p:cNvSpPr/>
+          <p:nvPr/>
+        </p:nvSpPr>
+        <p:spPr>
+          <a:xfrm>
+            <a:off x="317500" y="1299002"/>
+            <a:ext cx="8086724" cy="1938992"/>
+          </a:xfrm>
+          <a:prstGeom prst="rect">
+            <a:avLst/>
+          </a:prstGeom>
+        </p:spPr>
+        <p:txBody>
+          <a:bodyPr wrap="square">
+            <a:spAutoFit/>
+          </a:bodyPr>
+          <a:lstStyle/>
+          <a:p>
+            <a:pPr marL="342900" indent="-342900">
+              <a:buFont typeface="Arial" pitchFamily="34" charset="0"/>
+              <a:buChar char="•"/>
+            </a:pPr>
+            <a:r>
+              <a:rPr lang="en-US" dirty="0">
+                <a:hlinkClick r:id="rId2"/>
+              </a:rPr>
+              <a:t>https://www.mongodb.com/docs/manual</a:t>
+            </a:r>
+            <a:r>
+              <a:rPr lang="en-US" dirty="0" smtClean="0">
+                <a:hlinkClick r:id="rId2"/>
+              </a:rPr>
+              <a:t>/</a:t>
+            </a:r>
+            <a:endParaRPr lang="en-US" dirty="0" smtClean="0"/>
+          </a:p>
+          <a:p>
+            <a:pPr marL="342900" indent="-342900">
+              <a:buFont typeface="Arial" pitchFamily="34" charset="0"/>
+              <a:buChar char="•"/>
+            </a:pPr>
+            <a:r>
+              <a:rPr lang="en-US" dirty="0">
+                <a:hlinkClick r:id="rId3"/>
+              </a:rPr>
+              <a:t>https://</a:t>
+            </a:r>
+            <a:r>
+              <a:rPr lang="en-US" dirty="0" smtClean="0">
+                <a:hlinkClick r:id="rId3"/>
+              </a:rPr>
+              <a:t>www.tutorialspoint.com/mongodb/index.htm</a:t>
+            </a:r>
+            <a:endParaRPr lang="en-US" dirty="0" smtClean="0"/>
+          </a:p>
+          <a:p>
+            <a:pPr marL="342900" indent="-342900">
+              <a:buFont typeface="Arial" pitchFamily="34" charset="0"/>
+              <a:buChar char="•"/>
+            </a:pPr>
+            <a:r>
+              <a:rPr lang="en-US" dirty="0"/>
+              <a:t>https://www.geeksforgeeks.org/mongodb-an-introduction/</a:t>
+            </a:r>
+          </a:p>
+          <a:p>
+            <a:pPr marL="342900" indent="-342900">
+              <a:buFont typeface="Arial" pitchFamily="34" charset="0"/>
+              <a:buChar char="•"/>
+            </a:pPr>
+            <a:r>
+              <a:rPr lang="en-US" dirty="0" smtClean="0"/>
+              <a:t>https</a:t>
+            </a:r>
+            <a:r>
+              <a:rPr lang="en-US" dirty="0"/>
+              <a:t>://www.educba.com/mongodb-relationships/</a:t>
+            </a:r>
+          </a:p>
+        </p:txBody>
+      </p:sp>
     </p:spTree>
     <p:extLst>
       <p:ext uri="{BB962C8B-B14F-4D97-AF65-F5344CB8AC3E}">
@@ -24448,7 +25048,7 @@
 </p:sld>
 </file>
 
-<file path=ppt/slides/slide27.xml><?xml version="1.0" encoding="utf-8"?>
+<file path=ppt/slides/slide28.xml><?xml version="1.0" encoding="utf-8"?>
 <p:sld xmlns:a="http://schemas.openxmlformats.org/drawingml/2006/main" xmlns:r="http://schemas.openxmlformats.org/officeDocument/2006/relationships" xmlns:p="http://schemas.openxmlformats.org/presentationml/2006/main">
   <p:cSld>
     <p:spTree>
@@ -26912,7 +27512,7 @@
                 <a:gridCol w="3962400">
                   <a:extLst>
                     <a:ext uri="{9D8B030D-6E8A-4147-A177-3AD203B41FA5}">
-                      <a16:colId xmlns="" xmlns:a16="http://schemas.microsoft.com/office/drawing/2014/main" val="503657317"/>
+                      <a16:colId xmlns:a16="http://schemas.microsoft.com/office/drawing/2014/main" xmlns="" val="503657317"/>
                     </a:ext>
                   </a:extLst>
                 </a:gridCol>
@@ -26999,7 +27599,7 @@
                 </a:tc>
                 <a:extLst>
                   <a:ext uri="{0D108BD9-81ED-4DB2-BD59-A6C34878D82A}">
-                    <a16:rowId xmlns="" xmlns:a16="http://schemas.microsoft.com/office/drawing/2014/main" val="3486062454"/>
+                    <a16:rowId xmlns:a16="http://schemas.microsoft.com/office/drawing/2014/main" xmlns="" val="3486062454"/>
                   </a:ext>
                 </a:extLst>
               </a:tr>
@@ -27073,7 +27673,7 @@
                 </a:tc>
                 <a:extLst>
                   <a:ext uri="{0D108BD9-81ED-4DB2-BD59-A6C34878D82A}">
-                    <a16:rowId xmlns="" xmlns:a16="http://schemas.microsoft.com/office/drawing/2014/main" val="3483879438"/>
+                    <a16:rowId xmlns:a16="http://schemas.microsoft.com/office/drawing/2014/main" xmlns="" val="3483879438"/>
                   </a:ext>
                 </a:extLst>
               </a:tr>
@@ -27147,7 +27747,7 @@
                 </a:tc>
                 <a:extLst>
                   <a:ext uri="{0D108BD9-81ED-4DB2-BD59-A6C34878D82A}">
-                    <a16:rowId xmlns="" xmlns:a16="http://schemas.microsoft.com/office/drawing/2014/main" val="2025451082"/>
+                    <a16:rowId xmlns:a16="http://schemas.microsoft.com/office/drawing/2014/main" xmlns="" val="2025451082"/>
                   </a:ext>
                 </a:extLst>
               </a:tr>
@@ -27221,7 +27821,7 @@
                 </a:tc>
                 <a:extLst>
                   <a:ext uri="{0D108BD9-81ED-4DB2-BD59-A6C34878D82A}">
-                    <a16:rowId xmlns="" xmlns:a16="http://schemas.microsoft.com/office/drawing/2014/main" val="2090870821"/>
+                    <a16:rowId xmlns:a16="http://schemas.microsoft.com/office/drawing/2014/main" xmlns="" val="2090870821"/>
                   </a:ext>
                 </a:extLst>
               </a:tr>
@@ -27295,7 +27895,7 @@
                 </a:tc>
                 <a:extLst>
                   <a:ext uri="{0D108BD9-81ED-4DB2-BD59-A6C34878D82A}">
-                    <a16:rowId xmlns="" xmlns:a16="http://schemas.microsoft.com/office/drawing/2014/main" val="35667927"/>
+                    <a16:rowId xmlns:a16="http://schemas.microsoft.com/office/drawing/2014/main" xmlns="" val="35667927"/>
                   </a:ext>
                 </a:extLst>
               </a:tr>
@@ -27369,7 +27969,7 @@
                 </a:tc>
                 <a:extLst>
                   <a:ext uri="{0D108BD9-81ED-4DB2-BD59-A6C34878D82A}">
-                    <a16:rowId xmlns="" xmlns:a16="http://schemas.microsoft.com/office/drawing/2014/main" val="175779202"/>
+                    <a16:rowId xmlns:a16="http://schemas.microsoft.com/office/drawing/2014/main" xmlns="" val="175779202"/>
                   </a:ext>
                 </a:extLst>
               </a:tr>
@@ -27443,7 +28043,7 @@
                 </a:tc>
                 <a:extLst>
                   <a:ext uri="{0D108BD9-81ED-4DB2-BD59-A6C34878D82A}">
-                    <a16:rowId xmlns="" xmlns:a16="http://schemas.microsoft.com/office/drawing/2014/main" val="1917049442"/>
+                    <a16:rowId xmlns:a16="http://schemas.microsoft.com/office/drawing/2014/main" xmlns="" val="1917049442"/>
                   </a:ext>
                 </a:extLst>
               </a:tr>
@@ -27495,7 +28095,7 @@
                 </a:tc>
                 <a:extLst>
                   <a:ext uri="{0D108BD9-81ED-4DB2-BD59-A6C34878D82A}">
-                    <a16:rowId xmlns="" xmlns:a16="http://schemas.microsoft.com/office/drawing/2014/main" val="374744470"/>
+                    <a16:rowId xmlns:a16="http://schemas.microsoft.com/office/drawing/2014/main" xmlns="" val="374744470"/>
                   </a:ext>
                 </a:extLst>
               </a:tr>
@@ -27583,7 +28183,7 @@
                 </a:tc>
                 <a:extLst>
                   <a:ext uri="{0D108BD9-81ED-4DB2-BD59-A6C34878D82A}">
-                    <a16:rowId xmlns="" xmlns:a16="http://schemas.microsoft.com/office/drawing/2014/main" val="2878274362"/>
+                    <a16:rowId xmlns:a16="http://schemas.microsoft.com/office/drawing/2014/main" xmlns="" val="2878274362"/>
                   </a:ext>
                 </a:extLst>
               </a:tr>
@@ -27685,7 +28285,7 @@
                 </a:tc>
                 <a:extLst>
                   <a:ext uri="{0D108BD9-81ED-4DB2-BD59-A6C34878D82A}">
-                    <a16:rowId xmlns="" xmlns:a16="http://schemas.microsoft.com/office/drawing/2014/main" val="2159572466"/>
+                    <a16:rowId xmlns:a16="http://schemas.microsoft.com/office/drawing/2014/main" xmlns="" val="2159572466"/>
                   </a:ext>
                 </a:extLst>
               </a:tr>
@@ -31226,9 +31826,12 @@
 </file>
 
 <file path=customXml/item1.xml><?xml version="1.0" encoding="utf-8"?>
-<p:properties xmlns:p="http://schemas.microsoft.com/office/2006/metadata/properties" xmlns:xsi="http://www.w3.org/2001/XMLSchema-instance">
-  <documentManagement/>
-</p:properties>
+<?mso-contentType ?>
+<FormTemplates xmlns="http://schemas.microsoft.com/sharepoint/v3/contenttype/forms">
+  <Display>DocumentLibraryForm</Display>
+  <Edit>DocumentLibraryForm</Edit>
+  <New>DocumentLibraryForm</New>
+</FormTemplates>
 </file>
 
 <file path=customXml/item2.xml><?xml version="1.0" encoding="utf-8"?>
@@ -31281,24 +31884,15 @@
 </file>
 
 <file path=customXml/item3.xml><?xml version="1.0" encoding="utf-8"?>
-<?mso-contentType ?>
-<FormTemplates xmlns="http://schemas.microsoft.com/sharepoint/v3/contenttype/forms">
-  <Display>DocumentLibraryForm</Display>
-  <Edit>DocumentLibraryForm</Edit>
-  <New>DocumentLibraryForm</New>
-</FormTemplates>
+<p:properties xmlns:p="http://schemas.microsoft.com/office/2006/metadata/properties" xmlns:xsi="http://www.w3.org/2001/XMLSchema-instance">
+  <documentManagement/>
+</p:properties>
 </file>
 
 <file path=customXml/itemProps1.xml><?xml version="1.0" encoding="utf-8"?>
-<ds:datastoreItem xmlns:ds="http://schemas.openxmlformats.org/officeDocument/2006/customXml" ds:itemID="{537081CB-3FE8-42C0-9956-A2FA05BB7003}">
+<ds:datastoreItem xmlns:ds="http://schemas.openxmlformats.org/officeDocument/2006/customXml" ds:itemID="{DB029FC6-5F5D-40D4-867E-3987ADF6D13D}">
   <ds:schemaRefs>
-    <ds:schemaRef ds:uri="http://purl.org/dc/dcmitype/"/>
-    <ds:schemaRef ds:uri="http://schemas.microsoft.com/office/2006/documentManagement/types"/>
-    <ds:schemaRef ds:uri="http://schemas.microsoft.com/office/2006/metadata/properties"/>
-    <ds:schemaRef ds:uri="http://purl.org/dc/elements/1.1/"/>
-    <ds:schemaRef ds:uri="http://schemas.openxmlformats.org/package/2006/metadata/core-properties"/>
-    <ds:schemaRef ds:uri="http://www.w3.org/XML/1998/namespace"/>
-    <ds:schemaRef ds:uri="http://purl.org/dc/terms/"/>
+    <ds:schemaRef ds:uri="http://schemas.microsoft.com/sharepoint/v3/contenttype/forms"/>
   </ds:schemaRefs>
 </ds:datastoreItem>
 </file>
@@ -31319,9 +31913,15 @@
 </file>
 
 <file path=customXml/itemProps3.xml><?xml version="1.0" encoding="utf-8"?>
-<ds:datastoreItem xmlns:ds="http://schemas.openxmlformats.org/officeDocument/2006/customXml" ds:itemID="{DB029FC6-5F5D-40D4-867E-3987ADF6D13D}">
+<ds:datastoreItem xmlns:ds="http://schemas.openxmlformats.org/officeDocument/2006/customXml" ds:itemID="{537081CB-3FE8-42C0-9956-A2FA05BB7003}">
   <ds:schemaRefs>
-    <ds:schemaRef ds:uri="http://schemas.microsoft.com/sharepoint/v3/contenttype/forms"/>
+    <ds:schemaRef ds:uri="http://purl.org/dc/dcmitype/"/>
+    <ds:schemaRef ds:uri="http://schemas.microsoft.com/office/2006/documentManagement/types"/>
+    <ds:schemaRef ds:uri="http://schemas.microsoft.com/office/2006/metadata/properties"/>
+    <ds:schemaRef ds:uri="http://purl.org/dc/elements/1.1/"/>
+    <ds:schemaRef ds:uri="http://schemas.openxmlformats.org/package/2006/metadata/core-properties"/>
+    <ds:schemaRef ds:uri="http://www.w3.org/XML/1998/namespace"/>
+    <ds:schemaRef ds:uri="http://purl.org/dc/terms/"/>
   </ds:schemaRefs>
 </ds:datastoreItem>
 </file>
</xml_diff>